<commit_message>
REPORTGEN-390 : add chinese template from Kevin
</commit_message>
<xml_diff>
--- a/CastReporting.Reporting/TemplatesFiles/zh-CN/Generic Graph Definition.pptx
+++ b/CastReporting.Reporting/TemplatesFiles/zh-CN/Generic Graph Definition.pptx
@@ -9975,7 +9975,7 @@
           <a:p>
             <a:fld id="{BE7CF963-E58D-FC4D-BA9E-60A980752DC6}" type="datetimeFigureOut">
               <a:rPr lang="en-US" smtClean="0"/>
-              <a:t>7/5/2018</a:t>
+              <a:t>9/7/2018</a:t>
             </a:fld>
             <a:endParaRPr lang="en-US"/>
           </a:p>
@@ -10464,7 +10464,7 @@
           <a:p>
             <a:fld id="{B590C078-9131-4E49-8A0D-400FEE8377B5}" type="datetimeFigureOut">
               <a:rPr lang="en-US" smtClean="0"/>
-              <a:t>7/5/2018</a:t>
+              <a:t>9/7/2018</a:t>
             </a:fld>
             <a:endParaRPr lang="en-US"/>
           </a:p>
@@ -14049,7 +14049,7 @@
           <a:p>
             <a:fld id="{B590C078-9131-4E49-8A0D-400FEE8377B5}" type="datetimeFigureOut">
               <a:rPr lang="en-US" smtClean="0"/>
-              <a:t>7/5/2018</a:t>
+              <a:t>9/7/2018</a:t>
             </a:fld>
             <a:endParaRPr lang="en-US"/>
           </a:p>
@@ -18127,7 +18127,7 @@
           <a:p>
             <a:fld id="{B590C078-9131-4E49-8A0D-400FEE8377B5}" type="datetimeFigureOut">
               <a:rPr lang="en-US" smtClean="0"/>
-              <a:t>7/5/2018</a:t>
+              <a:t>9/7/2018</a:t>
             </a:fld>
             <a:endParaRPr lang="en-US"/>
           </a:p>
@@ -21952,7 +21952,7 @@
           <a:p>
             <a:fld id="{B590C078-9131-4E49-8A0D-400FEE8377B5}" type="datetimeFigureOut">
               <a:rPr lang="en-US" smtClean="0"/>
-              <a:t>7/5/2018</a:t>
+              <a:t>9/7/2018</a:t>
             </a:fld>
             <a:endParaRPr lang="en-US"/>
           </a:p>
@@ -24644,7 +24644,15 @@
             </a:r>
             <a:r>
               <a:rPr lang="en-GB" dirty="0"/>
-              <a:t>The selection of metrics by standard quality tag name should only be used for an application where the extension “Standard Quality Rules” is installed. If not, no metrics will be selected and </a:t>
+              <a:t>The selection of metrics by standard quality tag name should only be used for an application where the </a:t>
+            </a:r>
+            <a:r>
+              <a:rPr lang="en-GB"/>
+              <a:t>extension “Quality Standards Support” </a:t>
+            </a:r>
+            <a:r>
+              <a:rPr lang="en-GB" dirty="0"/>
+              <a:t>is installed. If not, no metrics will be selected and </a:t>
             </a:r>
             <a:r>
               <a:rPr lang="en-US" dirty="0"/>

</xml_diff>